<commit_message>
Corrected spelling in PPTX
</commit_message>
<xml_diff>
--- a/AzureDemo.pptx
+++ b/AzureDemo.pptx
@@ -105,6 +105,11 @@
       </a:defRPr>
     </a:lvl9pPr>
   </p:defaultTextStyle>
+  <p:extLst>
+    <p:ext uri="{EFAFB233-063F-42B5-8137-9DF3F51BA10A}">
+      <p15:sldGuideLst xmlns:p15="http://schemas.microsoft.com/office/powerpoint/2012/main"/>
+    </p:ext>
+  </p:extLst>
 </p:presentation>
 </file>
 
@@ -1108,10 +1113,9 @@
         <a:lstStyle/>
         <a:p>
           <a:r>
-            <a:rPr lang="da-DK" dirty="0" err="1"/>
-            <a:t>Envinronment</a:t>
+            <a:rPr lang="da-DK" dirty="0"/>
+            <a:t>Environment</a:t>
           </a:r>
-          <a:endParaRPr lang="da-DK" dirty="0"/>
         </a:p>
       </dgm:t>
     </dgm:pt>
@@ -3004,10 +3008,9 @@
             <a:buNone/>
           </a:pPr>
           <a:r>
-            <a:rPr lang="da-DK" sz="1500" kern="1200" dirty="0" err="1"/>
-            <a:t>Envinronment</a:t>
+            <a:rPr lang="da-DK" sz="1500" kern="1200" dirty="0"/>
+            <a:t>Environment</a:t>
           </a:r>
-          <a:endParaRPr lang="da-DK" sz="1500" kern="1200" dirty="0"/>
         </a:p>
       </dsp:txBody>
       <dsp:txXfrm>
@@ -8405,31 +8408,6 @@
       </p:grpSpPr>
       <p:sp>
         <p:nvSpPr>
-          <p:cNvPr id="2" name="Titel 1">
-            <a:extLst>
-              <a:ext uri="{FF2B5EF4-FFF2-40B4-BE49-F238E27FC236}">
-                <a16:creationId xmlns:a16="http://schemas.microsoft.com/office/drawing/2014/main" id="{7BA41532-5A37-AE48-B01B-5909DD7478BC}"/>
-              </a:ext>
-            </a:extLst>
-          </p:cNvPr>
-          <p:cNvSpPr>
-            <a:spLocks noGrp="1"/>
-          </p:cNvSpPr>
-          <p:nvPr>
-            <p:ph type="ctrTitle"/>
-          </p:nvPr>
-        </p:nvSpPr>
-        <p:spPr/>
-        <p:txBody>
-          <a:bodyPr/>
-          <a:lstStyle/>
-          <a:p>
-            <a:endParaRPr lang="da-DK" dirty="0"/>
-          </a:p>
-        </p:txBody>
-      </p:sp>
-      <p:sp>
-        <p:nvSpPr>
           <p:cNvPr id="3" name="Undertitel 2">
             <a:extLst>
               <a:ext uri="{FF2B5EF4-FFF2-40B4-BE49-F238E27FC236}">
@@ -8446,8 +8424,8 @@
         </p:nvSpPr>
         <p:spPr>
           <a:xfrm>
-            <a:off x="1524000" y="1122363"/>
-            <a:ext cx="9144000" cy="5029055"/>
+            <a:off x="1524000" y="685801"/>
+            <a:ext cx="9144000" cy="5465618"/>
           </a:xfrm>
         </p:spPr>
         <p:txBody>
@@ -8460,7 +8438,10 @@
               <a:rPr lang="da-DK" dirty="0" err="1"/>
               <a:t>Prerequites</a:t>
             </a:r>
-            <a:endParaRPr lang="da-DK" dirty="0"/>
+            <a:r>
+              <a:rPr lang="da-DK" dirty="0"/>
+              <a:t>:</a:t>
+            </a:r>
           </a:p>
           <a:p>
             <a:r>
@@ -8584,7 +8565,7 @@
             <p:ph idx="1"/>
             <p:extLst>
               <p:ext uri="{D42A27DB-BD31-4B8C-83A1-F6EECF244321}">
-                <p14:modId xmlns:p14="http://schemas.microsoft.com/office/powerpoint/2010/main" val="1872422187"/>
+                <p14:modId xmlns:p14="http://schemas.microsoft.com/office/powerpoint/2010/main" val="1093148272"/>
               </p:ext>
             </p:extLst>
           </p:nvPr>

</xml_diff>